<commit_message>
Improve sequence of actions table on slide 8.
</commit_message>
<xml_diff>
--- a/Lectures/Case Study - Atomics and Object Lifetime/Case Study - Atomics and Object Lifetime.pptx
+++ b/Lectures/Case Study - Atomics and Object Lifetime/Case Study - Atomics and Object Lifetime.pptx
@@ -200,7 +200,7 @@
           <a:p>
             <a:fld id="{DBE0ECA1-3FBF-48AE-AD2A-4439AE745E19}" type="datetimeFigureOut">
               <a:rPr lang="en-US" smtClean="0"/>
-              <a:t>12/24/2013</a:t>
+              <a:t>1/7/2014</a:t>
             </a:fld>
             <a:endParaRPr lang="en-US"/>
           </a:p>
@@ -661,7 +661,7 @@
           <a:p>
             <a:fld id="{9769DED8-28D4-45B9-A00F-7CFE9335FEA6}" type="datetime1">
               <a:rPr lang="en-US" smtClean="0"/>
-              <a:t>12/24/2013</a:t>
+              <a:t>1/7/2014</a:t>
             </a:fld>
             <a:endParaRPr lang="en-US"/>
           </a:p>
@@ -926,7 +926,7 @@
           <a:p>
             <a:fld id="{2DB3D439-1F88-44B4-B5F7-F9BCD4064257}" type="datetime1">
               <a:rPr lang="en-US" smtClean="0"/>
-              <a:t>12/24/2013</a:t>
+              <a:t>1/7/2014</a:t>
             </a:fld>
             <a:endParaRPr lang="en-US"/>
           </a:p>
@@ -1101,7 +1101,7 @@
           <a:p>
             <a:fld id="{99C5638F-6F55-4055-935C-67841BE78C36}" type="datetime1">
               <a:rPr lang="en-US" smtClean="0"/>
-              <a:t>12/24/2013</a:t>
+              <a:t>1/7/2014</a:t>
             </a:fld>
             <a:endParaRPr lang="en-US"/>
           </a:p>
@@ -1266,7 +1266,7 @@
           <a:p>
             <a:fld id="{E6987D90-0C92-4B22-A29D-FED15412CED2}" type="datetime1">
               <a:rPr lang="en-US" smtClean="0"/>
-              <a:t>12/24/2013</a:t>
+              <a:t>1/7/2014</a:t>
             </a:fld>
             <a:endParaRPr lang="en-US"/>
           </a:p>
@@ -1515,7 +1515,7 @@
           <a:p>
             <a:fld id="{DDB67BC4-9554-49E0-BCB3-D1EF965BA0B8}" type="datetime1">
               <a:rPr lang="en-US" smtClean="0"/>
-              <a:t>12/24/2013</a:t>
+              <a:t>1/7/2014</a:t>
             </a:fld>
             <a:endParaRPr lang="en-US"/>
           </a:p>
@@ -1798,7 +1798,7 @@
           <a:p>
             <a:fld id="{EC24D770-803D-4E01-921C-9C100DD8230C}" type="datetime1">
               <a:rPr lang="en-US" smtClean="0"/>
-              <a:t>12/24/2013</a:t>
+              <a:t>1/7/2014</a:t>
             </a:fld>
             <a:endParaRPr lang="en-US"/>
           </a:p>
@@ -2237,7 +2237,7 @@
           <a:p>
             <a:fld id="{356AD44B-78A4-4209-8070-7DCBE2DC4992}" type="datetime1">
               <a:rPr lang="en-US" smtClean="0"/>
-              <a:t>12/24/2013</a:t>
+              <a:t>1/7/2014</a:t>
             </a:fld>
             <a:endParaRPr lang="en-US"/>
           </a:p>
@@ -2350,7 +2350,7 @@
           <a:p>
             <a:fld id="{A993C59A-7CA2-467F-B7F1-9096881A01B8}" type="datetime1">
               <a:rPr lang="en-US" smtClean="0"/>
-              <a:t>12/24/2013</a:t>
+              <a:t>1/7/2014</a:t>
             </a:fld>
             <a:endParaRPr lang="en-US"/>
           </a:p>
@@ -2440,7 +2440,7 @@
           <a:p>
             <a:fld id="{2B6B58D0-2488-434A-8ED1-692E09B85CC5}" type="datetime1">
               <a:rPr lang="en-US" smtClean="0"/>
-              <a:t>12/24/2013</a:t>
+              <a:t>1/7/2014</a:t>
             </a:fld>
             <a:endParaRPr lang="en-US"/>
           </a:p>
@@ -2682,7 +2682,7 @@
           <a:p>
             <a:fld id="{FDB0AFC2-7D64-4F61-A7B7-9932D3305DDA}" type="datetime1">
               <a:rPr lang="en-US" smtClean="0"/>
-              <a:t>12/24/2013</a:t>
+              <a:t>1/7/2014</a:t>
             </a:fld>
             <a:endParaRPr lang="en-US"/>
           </a:p>
@@ -2976,7 +2976,7 @@
           <a:p>
             <a:fld id="{4983D17A-D7B2-4ECE-8A2C-93679B9D177B}" type="datetime1">
               <a:rPr lang="en-US" smtClean="0"/>
-              <a:t>12/24/2013</a:t>
+              <a:t>1/7/2014</a:t>
             </a:fld>
             <a:endParaRPr lang="en-US"/>
           </a:p>
@@ -3270,7 +3270,7 @@
           <a:p>
             <a:fld id="{2A5275F7-419E-4C23-8A3D-2EE5742B2EC9}" type="datetime1">
               <a:rPr lang="en-US" smtClean="0"/>
-              <a:t>12/24/2013</a:t>
+              <a:t>1/7/2014</a:t>
             </a:fld>
             <a:endParaRPr lang="en-US"/>
           </a:p>
@@ -5148,7 +5148,11 @@
           <a:p>
             <a:r>
               <a:rPr lang="en-US" dirty="0" smtClean="0"/>
-              <a:t>Sequence of executions</a:t>
+              <a:t>Sequence of </a:t>
+            </a:r>
+            <a:r>
+              <a:rPr lang="en-US" dirty="0" smtClean="0"/>
+              <a:t>actions</a:t>
             </a:r>
             <a:endParaRPr lang="en-US" dirty="0"/>
           </a:p>
@@ -5211,14 +5215,14 @@
           <p:nvPr>
             <p:extLst>
               <p:ext uri="{D42A27DB-BD31-4B8C-83A1-F6EECF244321}">
-                <p14:modId xmlns:p14="http://schemas.microsoft.com/office/powerpoint/2010/main" val="2062487927"/>
+                <p14:modId xmlns:p14="http://schemas.microsoft.com/office/powerpoint/2010/main" val="1607956620"/>
               </p:ext>
             </p:extLst>
           </p:nvPr>
         </p:nvGraphicFramePr>
         <p:xfrm>
-          <a:off x="457200" y="2590800"/>
-          <a:ext cx="7924800" cy="2595880"/>
+          <a:off x="152400" y="2590800"/>
+          <a:ext cx="8686800" cy="2865120"/>
         </p:xfrm>
         <a:graphic>
           <a:graphicData uri="http://schemas.openxmlformats.org/drawingml/2006/table">
@@ -5227,11 +5231,12 @@
                 <a:tableStyleId>{5C22544A-7EE6-4342-B048-85BDC9FD1C3A}</a:tableStyleId>
               </a:tblPr>
               <a:tblGrid>
-                <a:gridCol w="762000"/>
-                <a:gridCol w="990600"/>
-                <a:gridCol w="762000"/>
-                <a:gridCol w="4343400"/>
-                <a:gridCol w="1066800"/>
+                <a:gridCol w="835270"/>
+                <a:gridCol w="1085850"/>
+                <a:gridCol w="918796"/>
+                <a:gridCol w="2951284"/>
+                <a:gridCol w="1371600"/>
+                <a:gridCol w="1524000"/>
               </a:tblGrid>
               <a:tr h="370840">
                 <a:tc>
@@ -5300,7 +5305,34 @@
                           <a:latin typeface="Courier New" panose="02070309020205020404" pitchFamily="49" charset="0"/>
                           <a:cs typeface="Courier New" panose="02070309020205020404" pitchFamily="49" charset="0"/>
                         </a:rPr>
-                        <a:t>count_</a:t>
+                        <a:t>count</a:t>
+                      </a:r>
+                      <a:r>
+                        <a:rPr lang="en-US" dirty="0" smtClean="0">
+                          <a:latin typeface="Courier New" panose="02070309020205020404" pitchFamily="49" charset="0"/>
+                          <a:cs typeface="Courier New" panose="02070309020205020404" pitchFamily="49" charset="0"/>
+                        </a:rPr>
+                        <a:t>_ before</a:t>
+                      </a:r>
+                      <a:endParaRPr lang="en-US" dirty="0">
+                        <a:latin typeface="Courier New" panose="02070309020205020404" pitchFamily="49" charset="0"/>
+                        <a:cs typeface="Courier New" panose="02070309020205020404" pitchFamily="49" charset="0"/>
+                      </a:endParaRPr>
+                    </a:p>
+                  </a:txBody>
+                  <a:tcPr/>
+                </a:tc>
+                <a:tc>
+                  <a:txBody>
+                    <a:bodyPr/>
+                    <a:lstStyle/>
+                    <a:p>
+                      <a:r>
+                        <a:rPr lang="en-US" dirty="0" smtClean="0">
+                          <a:latin typeface="Courier New" panose="02070309020205020404" pitchFamily="49" charset="0"/>
+                          <a:cs typeface="Courier New" panose="02070309020205020404" pitchFamily="49" charset="0"/>
+                        </a:rPr>
+                        <a:t>count_ after</a:t>
                       </a:r>
                       <a:endParaRPr lang="en-US" dirty="0">
                         <a:latin typeface="Courier New" panose="02070309020205020404" pitchFamily="49" charset="0"/>
@@ -5382,6 +5414,20 @@
                       <a:r>
                         <a:rPr lang="en-US" dirty="0" smtClean="0"/>
                         <a:t>2</a:t>
+                      </a:r>
+                      <a:endParaRPr lang="en-US" dirty="0"/>
+                    </a:p>
+                  </a:txBody>
+                  <a:tcPr/>
+                </a:tc>
+                <a:tc>
+                  <a:txBody>
+                    <a:bodyPr/>
+                    <a:lstStyle/>
+                    <a:p>
+                      <a:r>
+                        <a:rPr lang="en-US" dirty="0" smtClean="0"/>
+                        <a:t>1</a:t>
                       </a:r>
                       <a:endParaRPr lang="en-US" dirty="0"/>
                     </a:p>
@@ -5472,7 +5518,21 @@
                     <a:p>
                       <a:r>
                         <a:rPr lang="en-US" dirty="0" smtClean="0"/>
-                        <a:t>2</a:t>
+                        <a:t>1</a:t>
+                      </a:r>
+                      <a:endParaRPr lang="en-US" dirty="0"/>
+                    </a:p>
+                  </a:txBody>
+                  <a:tcPr/>
+                </a:tc>
+                <a:tc>
+                  <a:txBody>
+                    <a:bodyPr/>
+                    <a:lstStyle/>
+                    <a:p>
+                      <a:r>
+                        <a:rPr lang="en-US" dirty="0" smtClean="0"/>
+                        <a:t>0</a:t>
                       </a:r>
                       <a:endParaRPr lang="en-US" dirty="0"/>
                     </a:p>
@@ -5544,7 +5604,21 @@
                     <a:p>
                       <a:r>
                         <a:rPr lang="en-US" dirty="0" smtClean="0"/>
-                        <a:t>1</a:t>
+                        <a:t>0</a:t>
+                      </a:r>
+                      <a:endParaRPr lang="en-US" dirty="0"/>
+                    </a:p>
+                  </a:txBody>
+                  <a:tcPr/>
+                </a:tc>
+                <a:tc>
+                  <a:txBody>
+                    <a:bodyPr/>
+                    <a:lstStyle/>
+                    <a:p>
+                      <a:r>
+                        <a:rPr lang="en-US" dirty="0" smtClean="0"/>
+                        <a:t>X</a:t>
                       </a:r>
                       <a:endParaRPr lang="en-US" dirty="0"/>
                     </a:p>
@@ -5633,7 +5707,21 @@
                     <a:p>
                       <a:r>
                         <a:rPr lang="en-US" dirty="0" smtClean="0"/>
-                        <a:t>1</a:t>
+                        <a:t>0</a:t>
+                      </a:r>
+                      <a:endParaRPr lang="en-US" dirty="0"/>
+                    </a:p>
+                  </a:txBody>
+                  <a:tcPr/>
+                </a:tc>
+                <a:tc>
+                  <a:txBody>
+                    <a:bodyPr/>
+                    <a:lstStyle/>
+                    <a:p>
+                      <a:r>
+                        <a:rPr lang="en-US" dirty="0" smtClean="0"/>
+                        <a:t>X</a:t>
                       </a:r>
                       <a:endParaRPr lang="en-US" dirty="0"/>
                     </a:p>
@@ -5723,6 +5811,20 @@
                   </a:txBody>
                   <a:tcPr/>
                 </a:tc>
+                <a:tc>
+                  <a:txBody>
+                    <a:bodyPr/>
+                    <a:lstStyle/>
+                    <a:p>
+                      <a:r>
+                        <a:rPr lang="en-US" dirty="0" smtClean="0"/>
+                        <a:t>X</a:t>
+                      </a:r>
+                      <a:endParaRPr lang="en-US" dirty="0"/>
+                    </a:p>
+                  </a:txBody>
+                  <a:tcPr/>
+                </a:tc>
               </a:tr>
               <a:tr h="370840">
                 <a:tc>
@@ -5800,6 +5902,20 @@
                       <a:r>
                         <a:rPr lang="en-US" dirty="0" smtClean="0"/>
                         <a:t>0</a:t>
+                      </a:r>
+                      <a:endParaRPr lang="en-US" dirty="0"/>
+                    </a:p>
+                  </a:txBody>
+                  <a:tcPr/>
+                </a:tc>
+                <a:tc>
+                  <a:txBody>
+                    <a:bodyPr/>
+                    <a:lstStyle/>
+                    <a:p>
+                      <a:r>
+                        <a:rPr lang="en-US" dirty="0" smtClean="0"/>
+                        <a:t>X</a:t>
                       </a:r>
                       <a:endParaRPr lang="en-US" dirty="0"/>
                     </a:p>

</xml_diff>